<commit_message>
Add regulation about theme
</commit_message>
<xml_diff>
--- a/ArrowjsBasic.pptx
+++ b/ArrowjsBasic.pptx
@@ -5,7 +5,7 @@
     <p:sldMasterId id="2147483648" r:id="rId1"/>
   </p:sldMasterIdLst>
   <p:notesMasterIdLst>
-    <p:notesMasterId r:id="rId23"/>
+    <p:notesMasterId r:id="rId25"/>
   </p:notesMasterIdLst>
   <p:sldIdLst>
     <p:sldId id="306" r:id="rId2"/>
@@ -22,13 +22,15 @@
     <p:sldId id="310" r:id="rId13"/>
     <p:sldId id="311" r:id="rId14"/>
     <p:sldId id="313" r:id="rId15"/>
-    <p:sldId id="314" r:id="rId16"/>
-    <p:sldId id="312" r:id="rId17"/>
-    <p:sldId id="316" r:id="rId18"/>
-    <p:sldId id="317" r:id="rId19"/>
-    <p:sldId id="318" r:id="rId20"/>
-    <p:sldId id="319" r:id="rId21"/>
-    <p:sldId id="320" r:id="rId22"/>
+    <p:sldId id="323" r:id="rId16"/>
+    <p:sldId id="324" r:id="rId17"/>
+    <p:sldId id="322" r:id="rId18"/>
+    <p:sldId id="312" r:id="rId19"/>
+    <p:sldId id="316" r:id="rId20"/>
+    <p:sldId id="317" r:id="rId21"/>
+    <p:sldId id="318" r:id="rId22"/>
+    <p:sldId id="319" r:id="rId23"/>
+    <p:sldId id="320" r:id="rId24"/>
   </p:sldIdLst>
   <p:sldSz cx="9144000" cy="5143500" type="screen16x9"/>
   <p:notesSz cx="6858000" cy="9144000"/>
@@ -8020,138 +8022,238 @@
       </p:grpSpPr>
       <p:sp>
         <p:nvSpPr>
-          <p:cNvPr id="2" name="Oval 1"/>
-          <p:cNvSpPr/>
-          <p:nvPr/>
-        </p:nvSpPr>
-        <p:spPr>
-          <a:xfrm>
-            <a:off x="1219200" y="590550"/>
-            <a:ext cx="2209800" cy="1219200"/>
-          </a:xfrm>
-          <a:prstGeom prst="ellipse">
-            <a:avLst/>
-          </a:prstGeom>
-        </p:spPr>
-        <p:style>
-          <a:lnRef idx="1">
-            <a:schemeClr val="accent1"/>
-          </a:lnRef>
-          <a:fillRef idx="3">
-            <a:schemeClr val="accent1"/>
-          </a:fillRef>
-          <a:effectRef idx="2">
-            <a:schemeClr val="accent1"/>
-          </a:effectRef>
-          <a:fontRef idx="minor">
-            <a:schemeClr val="lt1"/>
-          </a:fontRef>
-        </p:style>
-        <p:txBody>
-          <a:bodyPr rtlCol="0" anchor="ctr"/>
-          <a:lstStyle/>
-          <a:p>
-            <a:pPr algn="ctr"/>
+          <p:cNvPr id="2" name="Text Placeholder 1"/>
+          <p:cNvSpPr>
+            <a:spLocks noGrp="1"/>
+          </p:cNvSpPr>
+          <p:nvPr>
+            <p:ph type="body" idx="1"/>
+          </p:nvPr>
+        </p:nvSpPr>
+        <p:spPr/>
+        <p:txBody>
+          <a:bodyPr/>
+          <a:lstStyle/>
+          <a:p>
             <a:r>
               <a:rPr lang="en-US"/>
-              <a:t>Core</a:t>
-            </a:r>
-          </a:p>
-        </p:txBody>
-      </p:sp>
-      <p:sp>
-        <p:nvSpPr>
-          <p:cNvPr id="4" name="Oval 3"/>
-          <p:cNvSpPr/>
-          <p:nvPr/>
-        </p:nvSpPr>
-        <p:spPr>
-          <a:xfrm>
-            <a:off x="1219200" y="2266950"/>
-            <a:ext cx="2209800" cy="1447800"/>
-          </a:xfrm>
-          <a:prstGeom prst="ellipse">
-            <a:avLst/>
-          </a:prstGeom>
-        </p:spPr>
-        <p:style>
-          <a:lnRef idx="1">
-            <a:schemeClr val="accent1"/>
-          </a:lnRef>
-          <a:fillRef idx="3">
-            <a:schemeClr val="accent1"/>
-          </a:fillRef>
-          <a:effectRef idx="2">
-            <a:schemeClr val="accent1"/>
-          </a:effectRef>
-          <a:fontRef idx="minor">
-            <a:schemeClr val="lt1"/>
-          </a:fontRef>
-        </p:style>
-        <p:txBody>
-          <a:bodyPr rtlCol="0" anchor="ctr"/>
-          <a:lstStyle/>
-          <a:p>
-            <a:pPr algn="ctr"/>
+              <a:t>Theme ở thư mục public</a:t>
+            </a:r>
+          </a:p>
+        </p:txBody>
+      </p:sp>
+      <p:sp>
+        <p:nvSpPr>
+          <p:cNvPr id="3" name="Content Placeholder 2"/>
+          <p:cNvSpPr>
+            <a:spLocks noGrp="1"/>
+          </p:cNvSpPr>
+          <p:nvPr>
+            <p:ph sz="half" idx="2"/>
+          </p:nvPr>
+        </p:nvSpPr>
+        <p:spPr/>
+        <p:txBody>
+          <a:bodyPr>
+            <a:noAutofit/>
+          </a:bodyPr>
+          <a:lstStyle/>
+          <a:p>
+            <a:r>
+              <a:rPr lang="en-US" sz="1800"/>
+              <a:t>Pro</a:t>
+            </a:r>
+          </a:p>
+          <a:p>
+            <a:pPr lvl="1">
+              <a:spcBef>
+                <a:spcPts val="600"/>
+              </a:spcBef>
+            </a:pPr>
+            <a:r>
+              <a:rPr lang="en-US" sz="1600"/>
+              <a:t>Cài đặt, gỡ gói theme dễ dàng</a:t>
+            </a:r>
+          </a:p>
+          <a:p>
+            <a:pPr lvl="1">
+              <a:spcBef>
+                <a:spcPts val="600"/>
+              </a:spcBef>
+            </a:pPr>
+            <a:r>
+              <a:rPr lang="en-US" sz="1600"/>
+              <a:t>Phù hợp với post, page, các trang tiêu chuẩn</a:t>
+            </a:r>
+          </a:p>
+          <a:p>
+            <a:pPr lvl="1">
+              <a:spcBef>
+                <a:spcPts val="600"/>
+              </a:spcBef>
+            </a:pPr>
+            <a:r>
+              <a:rPr lang="en-US" sz="1600"/>
+              <a:t>Độc lập với các custom module</a:t>
+            </a:r>
+          </a:p>
+          <a:p>
+            <a:r>
+              <a:rPr lang="en-US" sz="1800"/>
+              <a:t>Cons</a:t>
+            </a:r>
+          </a:p>
+          <a:p>
+            <a:pPr lvl="1">
+              <a:spcBef>
+                <a:spcPts val="600"/>
+              </a:spcBef>
+            </a:pPr>
+            <a:r>
+              <a:rPr lang="en-US" sz="1600"/>
+              <a:t>Khi số lượng màn hình view lớn lên, module quản lý view lớn, theme sẽ lộn xộn</a:t>
+            </a:r>
+          </a:p>
+          <a:p>
+            <a:pPr lvl="1">
+              <a:spcBef>
+                <a:spcPts val="600"/>
+              </a:spcBef>
+            </a:pPr>
+            <a:r>
+              <a:rPr lang="en-US" sz="1600"/>
+              <a:t>Khó cái đặt thành gói với module</a:t>
+            </a:r>
+          </a:p>
+          <a:p>
+            <a:pPr lvl="1">
+              <a:spcBef>
+                <a:spcPts val="600"/>
+              </a:spcBef>
+            </a:pPr>
+            <a:r>
+              <a:rPr lang="en-US" sz="1600"/>
+              <a:t>Không hợp với các trang đặc thù</a:t>
+            </a:r>
+          </a:p>
+        </p:txBody>
+      </p:sp>
+      <p:sp>
+        <p:nvSpPr>
+          <p:cNvPr id="4" name="Text Placeholder 3"/>
+          <p:cNvSpPr>
+            <a:spLocks noGrp="1"/>
+          </p:cNvSpPr>
+          <p:nvPr>
+            <p:ph type="body" sz="quarter" idx="3"/>
+          </p:nvPr>
+        </p:nvSpPr>
+        <p:spPr/>
+        <p:txBody>
+          <a:bodyPr/>
+          <a:lstStyle/>
+          <a:p>
             <a:r>
               <a:rPr lang="en-US"/>
-              <a:t>CMS</a:t>
-            </a:r>
-          </a:p>
-        </p:txBody>
-      </p:sp>
-      <p:sp>
-        <p:nvSpPr>
-          <p:cNvPr id="5" name="Oval 4"/>
-          <p:cNvSpPr/>
-          <p:nvPr/>
-        </p:nvSpPr>
-        <p:spPr>
-          <a:xfrm>
-            <a:off x="3505200" y="1352550"/>
-            <a:ext cx="2209800" cy="1447800"/>
-          </a:xfrm>
-          <a:prstGeom prst="ellipse">
-            <a:avLst/>
-          </a:prstGeom>
-        </p:spPr>
-        <p:style>
-          <a:lnRef idx="1">
-            <a:schemeClr val="accent1"/>
-          </a:lnRef>
-          <a:fillRef idx="3">
-            <a:schemeClr val="accent1"/>
-          </a:fillRef>
-          <a:effectRef idx="2">
-            <a:schemeClr val="accent1"/>
-          </a:effectRef>
-          <a:fontRef idx="minor">
-            <a:schemeClr val="lt1"/>
-          </a:fontRef>
-        </p:style>
-        <p:txBody>
-          <a:bodyPr rtlCol="0" anchor="ctr"/>
-          <a:lstStyle/>
-          <a:p>
-            <a:pPr algn="ctr"/>
-            <a:r>
-              <a:rPr lang="en-US"/>
-              <a:t>ActionHero</a:t>
-            </a:r>
-            <a:br>
-              <a:rPr lang="en-US"/>
-            </a:br>
-            <a:r>
-              <a:rPr lang="en-US"/>
-              <a:t>Seneca</a:t>
-            </a:r>
+              <a:t>Theme/View trong modules</a:t>
+            </a:r>
+          </a:p>
+        </p:txBody>
+      </p:sp>
+      <p:sp>
+        <p:nvSpPr>
+          <p:cNvPr id="5" name="Content Placeholder 4"/>
+          <p:cNvSpPr>
+            <a:spLocks noGrp="1"/>
+          </p:cNvSpPr>
+          <p:nvPr>
+            <p:ph sz="quarter" idx="4"/>
+          </p:nvPr>
+        </p:nvSpPr>
+        <p:spPr/>
+        <p:txBody>
+          <a:bodyPr>
+            <a:normAutofit/>
+          </a:bodyPr>
+          <a:lstStyle/>
+          <a:p>
+            <a:r>
+              <a:rPr lang="en-US" sz="2000"/>
+              <a:t>Pro</a:t>
+            </a:r>
+          </a:p>
+          <a:p>
+            <a:pPr lvl="1">
+              <a:spcBef>
+                <a:spcPts val="600"/>
+              </a:spcBef>
+            </a:pPr>
+            <a:r>
+              <a:rPr lang="en-US" sz="1600"/>
+              <a:t>Đi cùng model, controller trong module</a:t>
+            </a:r>
+          </a:p>
+          <a:p>
+            <a:pPr lvl="1">
+              <a:spcBef>
+                <a:spcPts val="600"/>
+              </a:spcBef>
+            </a:pPr>
+            <a:r>
+              <a:rPr lang="en-US" sz="1600"/>
+              <a:t>Cài đặt cùng với module thuận tiện với các màn hình đặc thù</a:t>
+            </a:r>
+          </a:p>
+          <a:p>
+            <a:pPr lvl="1">
+              <a:spcBef>
+                <a:spcPts val="600"/>
+              </a:spcBef>
+            </a:pPr>
+            <a:r>
+              <a:rPr lang="en-US" sz="1600"/>
+              <a:t>Gỡ module là gỡ luôn theme</a:t>
+            </a:r>
+            <a:endParaRPr lang="en-US" sz="1800"/>
+          </a:p>
+          <a:p>
+            <a:r>
+              <a:rPr lang="en-US" sz="2000"/>
+              <a:t>Cons</a:t>
+            </a:r>
+          </a:p>
+          <a:p>
+            <a:pPr lvl="1">
+              <a:spcBef>
+                <a:spcPts val="600"/>
+              </a:spcBef>
+            </a:pPr>
+            <a:r>
+              <a:rPr lang="en-US" sz="1600"/>
+              <a:t>Không cài đặt theme bằng câu lệnh</a:t>
+            </a:r>
+          </a:p>
+          <a:p>
+            <a:pPr lvl="1">
+              <a:spcBef>
+                <a:spcPts val="600"/>
+              </a:spcBef>
+            </a:pPr>
+            <a:r>
+              <a:rPr lang="en-US" sz="1600"/>
+              <a:t>Giới hạn dùng cho các màn hình đặc thù không phải post/page</a:t>
+            </a:r>
+          </a:p>
+          <a:p>
+            <a:pPr lvl="1"/>
+            <a:endParaRPr lang="en-US" sz="1600"/>
           </a:p>
         </p:txBody>
       </p:sp>
     </p:spTree>
     <p:extLst>
       <p:ext uri="{BB962C8B-B14F-4D97-AF65-F5344CB8AC3E}">
-        <p14:creationId xmlns:p14="http://schemas.microsoft.com/office/powerpoint/2010/main" val="1185610902"/>
+        <p14:creationId xmlns:p14="http://schemas.microsoft.com/office/powerpoint/2010/main" val="2233960805"/>
       </p:ext>
     </p:extLst>
   </p:cSld>
@@ -8180,7 +8282,7 @@
       </p:grpSpPr>
       <p:sp>
         <p:nvSpPr>
-          <p:cNvPr id="4" name="Title 3"/>
+          <p:cNvPr id="2" name="Title 1"/>
           <p:cNvSpPr>
             <a:spLocks noGrp="1"/>
           </p:cNvSpPr>
@@ -8197,14 +8299,14 @@
           <a:p>
             <a:r>
               <a:rPr lang="en-US"/>
-              <a:t>Arrowjs hơn / kém gì Mean?</a:t>
-            </a:r>
-          </a:p>
-        </p:txBody>
-      </p:sp>
-      <p:sp>
-        <p:nvSpPr>
-          <p:cNvPr id="5" name="Content Placeholder 4"/>
+              <a:t>Đề xuất cách xử lý</a:t>
+            </a:r>
+          </a:p>
+        </p:txBody>
+      </p:sp>
+      <p:sp>
+        <p:nvSpPr>
+          <p:cNvPr id="3" name="Content Placeholder 2"/>
           <p:cNvSpPr>
             <a:spLocks noGrp="1"/>
           </p:cNvSpPr>
@@ -8214,17 +8316,71 @@
         </p:nvSpPr>
         <p:spPr/>
         <p:txBody>
-          <a:bodyPr/>
-          <a:lstStyle/>
-          <a:p>
-            <a:endParaRPr lang="en-US"/>
+          <a:bodyPr>
+            <a:normAutofit/>
+          </a:bodyPr>
+          <a:lstStyle/>
+          <a:p>
+            <a:r>
+              <a:rPr lang="en-US" sz="2400"/>
+              <a:t>Theme chuẩn cho CMS (post, page, post list) sẽ để ở thư mục </a:t>
+            </a:r>
+            <a:r>
+              <a:rPr lang="en-US" sz="2400">
+                <a:solidFill>
+                  <a:srgbClr val="FFFF00"/>
+                </a:solidFill>
+              </a:rPr>
+              <a:t>public</a:t>
+            </a:r>
+            <a:r>
+              <a:rPr lang="en-US" sz="2400"/>
+              <a:t>. Cài đặt, quản lý dạng gói theme bằng lệnh </a:t>
+            </a:r>
+            <a:r>
+              <a:rPr lang="en-US" sz="2400">
+                <a:solidFill>
+                  <a:srgbClr val="FFFF00"/>
+                </a:solidFill>
+              </a:rPr>
+              <a:t>arrow install -t</a:t>
+            </a:r>
+          </a:p>
+          <a:p>
+            <a:r>
+              <a:rPr lang="en-US" sz="2400"/>
+              <a:t>View + theme cho các màn hình đặc thù (adhoc screen).</a:t>
+            </a:r>
+          </a:p>
+          <a:p>
+            <a:r>
+              <a:rPr lang="en-US" sz="2400"/>
+              <a:t>Mức độ ưu tiên:</a:t>
+            </a:r>
+          </a:p>
+          <a:p>
+            <a:pPr lvl="1"/>
+            <a:r>
+              <a:rPr lang="en-US" sz="2000"/>
+              <a:t>Gói theme trong public buộc phải có để hỗ trợ chức năng CMS và back end căn bản</a:t>
+            </a:r>
+          </a:p>
+          <a:p>
+            <a:pPr lvl="1"/>
+            <a:r>
+              <a:rPr lang="en-US" sz="2000"/>
+              <a:t>Theme đi cùng module mở rộng thì có hoặc không có.</a:t>
+            </a:r>
+          </a:p>
+          <a:p>
+            <a:endParaRPr lang="en-US" sz="2400"/>
           </a:p>
         </p:txBody>
       </p:sp>
     </p:spTree>
     <p:extLst>
       <p:ext uri="{BB962C8B-B14F-4D97-AF65-F5344CB8AC3E}">
-        <p14:creationId xmlns:p14="http://schemas.microsoft.com/office/powerpoint/2010/main" val="1432642335"/>
+        <p14:creationId xmlns:p14="http://schemas.microsoft.com/office/powerpoint/2010/main" val="1009034914"/>
       </p:ext>
     </p:extLst>
   </p:cSld>
@@ -8253,7 +8409,7 @@
       </p:grpSpPr>
       <p:sp>
         <p:nvSpPr>
-          <p:cNvPr id="4" name="Title 3"/>
+          <p:cNvPr id="2" name="Title 1"/>
           <p:cNvSpPr>
             <a:spLocks noGrp="1"/>
           </p:cNvSpPr>
@@ -8263,41 +8419,20 @@
         </p:nvSpPr>
         <p:spPr/>
         <p:txBody>
-          <a:bodyPr>
-            <a:normAutofit fontScale="90000"/>
-          </a:bodyPr>
+          <a:bodyPr/>
           <a:lstStyle/>
           <a:p>
             <a:r>
               <a:rPr lang="en-US"/>
-              <a:t>Arrowjs hơn / kém gì Sails</a:t>
-            </a:r>
-          </a:p>
-        </p:txBody>
-      </p:sp>
-      <p:sp>
-        <p:nvSpPr>
-          <p:cNvPr id="5" name="Content Placeholder 4"/>
-          <p:cNvSpPr>
-            <a:spLocks noGrp="1"/>
-          </p:cNvSpPr>
-          <p:nvPr>
-            <p:ph idx="1"/>
-          </p:nvPr>
-        </p:nvSpPr>
-        <p:spPr/>
-        <p:txBody>
-          <a:bodyPr/>
-          <a:lstStyle/>
-          <a:p>
-            <a:endParaRPr lang="en-US"/>
+              <a:t>So sánh với các framework khác</a:t>
+            </a:r>
           </a:p>
         </p:txBody>
       </p:sp>
     </p:spTree>
     <p:extLst>
       <p:ext uri="{BB962C8B-B14F-4D97-AF65-F5344CB8AC3E}">
-        <p14:creationId xmlns:p14="http://schemas.microsoft.com/office/powerpoint/2010/main" val="2155063266"/>
+        <p14:creationId xmlns:p14="http://schemas.microsoft.com/office/powerpoint/2010/main" val="3235207094"/>
       </p:ext>
     </p:extLst>
   </p:cSld>
@@ -8343,7 +8478,7 @@
           <a:p>
             <a:r>
               <a:rPr lang="en-US"/>
-              <a:t>Arrowjs hơn / kém gì BluePencil</a:t>
+              <a:t>Arrowjs hơn / kém gì Mean?</a:t>
             </a:r>
           </a:p>
         </p:txBody>
@@ -8370,7 +8505,7 @@
     </p:spTree>
     <p:extLst>
       <p:ext uri="{BB962C8B-B14F-4D97-AF65-F5344CB8AC3E}">
-        <p14:creationId xmlns:p14="http://schemas.microsoft.com/office/powerpoint/2010/main" val="504847344"/>
+        <p14:creationId xmlns:p14="http://schemas.microsoft.com/office/powerpoint/2010/main" val="1432642335"/>
       </p:ext>
     </p:extLst>
   </p:cSld>
@@ -8416,7 +8551,7 @@
           <a:p>
             <a:r>
               <a:rPr lang="en-US"/>
-              <a:t>Arrowjs hơn / kém gì Meteor</a:t>
+              <a:t>Arrowjs hơn / kém gì Sails</a:t>
             </a:r>
           </a:p>
         </p:txBody>
@@ -8443,7 +8578,7 @@
     </p:spTree>
     <p:extLst>
       <p:ext uri="{BB962C8B-B14F-4D97-AF65-F5344CB8AC3E}">
-        <p14:creationId xmlns:p14="http://schemas.microsoft.com/office/powerpoint/2010/main" val="3703071390"/>
+        <p14:creationId xmlns:p14="http://schemas.microsoft.com/office/powerpoint/2010/main" val="2155063266"/>
       </p:ext>
     </p:extLst>
   </p:cSld>
@@ -8554,6 +8689,152 @@
       </p:grpSpPr>
       <p:sp>
         <p:nvSpPr>
+          <p:cNvPr id="4" name="Title 3"/>
+          <p:cNvSpPr>
+            <a:spLocks noGrp="1"/>
+          </p:cNvSpPr>
+          <p:nvPr>
+            <p:ph type="title"/>
+          </p:nvPr>
+        </p:nvSpPr>
+        <p:spPr/>
+        <p:txBody>
+          <a:bodyPr>
+            <a:normAutofit fontScale="90000"/>
+          </a:bodyPr>
+          <a:lstStyle/>
+          <a:p>
+            <a:r>
+              <a:rPr lang="en-US"/>
+              <a:t>Arrowjs hơn / kém gì BluePencil</a:t>
+            </a:r>
+          </a:p>
+        </p:txBody>
+      </p:sp>
+      <p:sp>
+        <p:nvSpPr>
+          <p:cNvPr id="5" name="Content Placeholder 4"/>
+          <p:cNvSpPr>
+            <a:spLocks noGrp="1"/>
+          </p:cNvSpPr>
+          <p:nvPr>
+            <p:ph idx="1"/>
+          </p:nvPr>
+        </p:nvSpPr>
+        <p:spPr/>
+        <p:txBody>
+          <a:bodyPr/>
+          <a:lstStyle/>
+          <a:p>
+            <a:endParaRPr lang="en-US"/>
+          </a:p>
+        </p:txBody>
+      </p:sp>
+    </p:spTree>
+    <p:extLst>
+      <p:ext uri="{BB962C8B-B14F-4D97-AF65-F5344CB8AC3E}">
+        <p14:creationId xmlns:p14="http://schemas.microsoft.com/office/powerpoint/2010/main" val="504847344"/>
+      </p:ext>
+    </p:extLst>
+  </p:cSld>
+  <p:clrMapOvr>
+    <a:masterClrMapping/>
+  </p:clrMapOvr>
+</p:sld>
+</file>
+
+<file path=ppt/slides/slide21.xml><?xml version="1.0" encoding="utf-8"?>
+<p:sld xmlns:a="http://schemas.openxmlformats.org/drawingml/2006/main" xmlns:r="http://schemas.openxmlformats.org/officeDocument/2006/relationships" xmlns:p="http://schemas.openxmlformats.org/presentationml/2006/main">
+  <p:cSld>
+    <p:spTree>
+      <p:nvGrpSpPr>
+        <p:cNvPr id="1" name=""/>
+        <p:cNvGrpSpPr/>
+        <p:nvPr/>
+      </p:nvGrpSpPr>
+      <p:grpSpPr>
+        <a:xfrm>
+          <a:off x="0" y="0"/>
+          <a:ext cx="0" cy="0"/>
+          <a:chOff x="0" y="0"/>
+          <a:chExt cx="0" cy="0"/>
+        </a:xfrm>
+      </p:grpSpPr>
+      <p:sp>
+        <p:nvSpPr>
+          <p:cNvPr id="4" name="Title 3"/>
+          <p:cNvSpPr>
+            <a:spLocks noGrp="1"/>
+          </p:cNvSpPr>
+          <p:nvPr>
+            <p:ph type="title"/>
+          </p:nvPr>
+        </p:nvSpPr>
+        <p:spPr/>
+        <p:txBody>
+          <a:bodyPr>
+            <a:normAutofit fontScale="90000"/>
+          </a:bodyPr>
+          <a:lstStyle/>
+          <a:p>
+            <a:r>
+              <a:rPr lang="en-US"/>
+              <a:t>Arrowjs hơn / kém gì Meteor</a:t>
+            </a:r>
+          </a:p>
+        </p:txBody>
+      </p:sp>
+      <p:sp>
+        <p:nvSpPr>
+          <p:cNvPr id="5" name="Content Placeholder 4"/>
+          <p:cNvSpPr>
+            <a:spLocks noGrp="1"/>
+          </p:cNvSpPr>
+          <p:nvPr>
+            <p:ph idx="1"/>
+          </p:nvPr>
+        </p:nvSpPr>
+        <p:spPr/>
+        <p:txBody>
+          <a:bodyPr/>
+          <a:lstStyle/>
+          <a:p>
+            <a:endParaRPr lang="en-US"/>
+          </a:p>
+        </p:txBody>
+      </p:sp>
+    </p:spTree>
+    <p:extLst>
+      <p:ext uri="{BB962C8B-B14F-4D97-AF65-F5344CB8AC3E}">
+        <p14:creationId xmlns:p14="http://schemas.microsoft.com/office/powerpoint/2010/main" val="3703071390"/>
+      </p:ext>
+    </p:extLst>
+  </p:cSld>
+  <p:clrMapOvr>
+    <a:masterClrMapping/>
+  </p:clrMapOvr>
+</p:sld>
+</file>
+
+<file path=ppt/slides/slide22.xml><?xml version="1.0" encoding="utf-8"?>
+<p:sld xmlns:a="http://schemas.openxmlformats.org/drawingml/2006/main" xmlns:r="http://schemas.openxmlformats.org/officeDocument/2006/relationships" xmlns:p="http://schemas.openxmlformats.org/presentationml/2006/main">
+  <p:cSld>
+    <p:spTree>
+      <p:nvGrpSpPr>
+        <p:cNvPr id="1" name=""/>
+        <p:cNvGrpSpPr/>
+        <p:nvPr/>
+      </p:nvGrpSpPr>
+      <p:grpSpPr>
+        <a:xfrm>
+          <a:off x="0" y="0"/>
+          <a:ext cx="0" cy="0"/>
+          <a:chOff x="0" y="0"/>
+          <a:chExt cx="0" cy="0"/>
+        </a:xfrm>
+      </p:grpSpPr>
+      <p:sp>
+        <p:nvSpPr>
           <p:cNvPr id="2" name="Title 1"/>
           <p:cNvSpPr>
             <a:spLocks noGrp="1"/>
@@ -8593,7 +8874,14 @@
           <a:p>
             <a:r>
               <a:rPr lang="en-US"/>
-              <a:t>CMS Khó nâng cấp</a:t>
+              <a:t>CMS khó nâng cấp</a:t>
+            </a:r>
+          </a:p>
+          <a:p>
+            <a:pPr lvl="1"/>
+            <a:r>
+              <a:rPr lang="en-US"/>
+              <a:t>Cập nhật CMS mới có thể phá vỡ code cũ</a:t>
             </a:r>
           </a:p>
           <a:p>
@@ -8604,6 +8892,13 @@
             <a:r>
               <a:rPr lang="en-US"/>
               <a:t>Vấn đề bảo mật</a:t>
+            </a:r>
+          </a:p>
+          <a:p>
+            <a:pPr lvl="1"/>
+            <a:r>
+              <a:rPr lang="en-US"/>
+              <a:t>Helmet</a:t>
             </a:r>
           </a:p>
           <a:p>
@@ -8624,7 +8919,7 @@
 </p:sld>
 </file>
 
-<file path=ppt/slides/slide21.xml><?xml version="1.0" encoding="utf-8"?>
+<file path=ppt/slides/slide23.xml><?xml version="1.0" encoding="utf-8"?>
 <p:sld xmlns:a="http://schemas.openxmlformats.org/drawingml/2006/main" xmlns:r="http://schemas.openxmlformats.org/officeDocument/2006/relationships" xmlns:p="http://schemas.openxmlformats.org/presentationml/2006/main">
   <p:cSld>
     <p:spTree>

</xml_diff>